<commit_message>
Updated dated files and images
</commit_message>
<xml_diff>
--- a/docs/deployment_guide/images/amc-architecture-diagrams-v1.pptx
+++ b/docs/deployment_guide/images/amc-architecture-diagrams-v1.pptx
@@ -5,13 +5,14 @@
     <p:sldMasterId id="2147483674" r:id="rId1"/>
   </p:sldMasterIdLst>
   <p:notesMasterIdLst>
-    <p:notesMasterId r:id="rId6"/>
+    <p:notesMasterId r:id="rId7"/>
   </p:notesMasterIdLst>
   <p:sldIdLst>
     <p:sldId id="460" r:id="rId2"/>
     <p:sldId id="444" r:id="rId3"/>
     <p:sldId id="448" r:id="rId4"/>
     <p:sldId id="451" r:id="rId5"/>
+    <p:sldId id="454" r:id="rId6"/>
   </p:sldIdLst>
   <p:sldSz cx="22860000" cy="14630400"/>
   <p:notesSz cx="6858000" cy="9144000"/>
@@ -119,6 +120,7 @@
             <p14:sldId id="444"/>
             <p14:sldId id="448"/>
             <p14:sldId id="451"/>
+            <p14:sldId id="454"/>
           </p14:sldIdLst>
         </p14:section>
       </p14:sectionLst>
@@ -212,7 +214,7 @@
           <a:p>
             <a:fld id="{DEC0E4F8-FC9B-C74A-97AB-66A417AA65A9}" type="datetimeFigureOut">
               <a:rPr lang="en-US" smtClean="0"/>
-              <a:t>4/26/22</a:t>
+              <a:t>5/10/22</a:t>
             </a:fld>
             <a:endParaRPr lang="en-US"/>
           </a:p>
@@ -1010,7 +1012,7 @@
           <a:p>
             <a:fld id="{B60C387C-249C-E74C-AA9C-592306AF9B93}" type="datetimeFigureOut">
               <a:rPr lang="en-US" smtClean="0"/>
-              <a:t>4/26/22</a:t>
+              <a:t>5/10/22</a:t>
             </a:fld>
             <a:endParaRPr lang="en-US"/>
           </a:p>
@@ -1180,7 +1182,7 @@
           <a:p>
             <a:fld id="{B60C387C-249C-E74C-AA9C-592306AF9B93}" type="datetimeFigureOut">
               <a:rPr lang="en-US" smtClean="0"/>
-              <a:t>4/26/22</a:t>
+              <a:t>5/10/22</a:t>
             </a:fld>
             <a:endParaRPr lang="en-US"/>
           </a:p>
@@ -1360,7 +1362,7 @@
           <a:p>
             <a:fld id="{B60C387C-249C-E74C-AA9C-592306AF9B93}" type="datetimeFigureOut">
               <a:rPr lang="en-US" smtClean="0"/>
-              <a:t>4/26/22</a:t>
+              <a:t>5/10/22</a:t>
             </a:fld>
             <a:endParaRPr lang="en-US"/>
           </a:p>
@@ -1662,7 +1664,7 @@
           <a:p>
             <a:fld id="{B60C387C-249C-E74C-AA9C-592306AF9B93}" type="datetimeFigureOut">
               <a:rPr lang="en-US" smtClean="0"/>
-              <a:t>4/26/22</a:t>
+              <a:t>5/10/22</a:t>
             </a:fld>
             <a:endParaRPr lang="en-US"/>
           </a:p>
@@ -1908,7 +1910,7 @@
           <a:p>
             <a:fld id="{B60C387C-249C-E74C-AA9C-592306AF9B93}" type="datetimeFigureOut">
               <a:rPr lang="en-US" smtClean="0"/>
-              <a:t>4/26/22</a:t>
+              <a:t>5/10/22</a:t>
             </a:fld>
             <a:endParaRPr lang="en-US"/>
           </a:p>
@@ -2140,7 +2142,7 @@
           <a:p>
             <a:fld id="{B60C387C-249C-E74C-AA9C-592306AF9B93}" type="datetimeFigureOut">
               <a:rPr lang="en-US" smtClean="0"/>
-              <a:t>4/26/22</a:t>
+              <a:t>5/10/22</a:t>
             </a:fld>
             <a:endParaRPr lang="en-US"/>
           </a:p>
@@ -2507,7 +2509,7 @@
           <a:p>
             <a:fld id="{B60C387C-249C-E74C-AA9C-592306AF9B93}" type="datetimeFigureOut">
               <a:rPr lang="en-US" smtClean="0"/>
-              <a:t>4/26/22</a:t>
+              <a:t>5/10/22</a:t>
             </a:fld>
             <a:endParaRPr lang="en-US"/>
           </a:p>
@@ -2625,7 +2627,7 @@
           <a:p>
             <a:fld id="{B60C387C-249C-E74C-AA9C-592306AF9B93}" type="datetimeFigureOut">
               <a:rPr lang="en-US" smtClean="0"/>
-              <a:t>4/26/22</a:t>
+              <a:t>5/10/22</a:t>
             </a:fld>
             <a:endParaRPr lang="en-US"/>
           </a:p>
@@ -2720,7 +2722,7 @@
           <a:p>
             <a:fld id="{B60C387C-249C-E74C-AA9C-592306AF9B93}" type="datetimeFigureOut">
               <a:rPr lang="en-US" smtClean="0"/>
-              <a:t>4/26/22</a:t>
+              <a:t>5/10/22</a:t>
             </a:fld>
             <a:endParaRPr lang="en-US"/>
           </a:p>
@@ -2997,7 +2999,7 @@
           <a:p>
             <a:fld id="{B60C387C-249C-E74C-AA9C-592306AF9B93}" type="datetimeFigureOut">
               <a:rPr lang="en-US" smtClean="0"/>
-              <a:t>4/26/22</a:t>
+              <a:t>5/10/22</a:t>
             </a:fld>
             <a:endParaRPr lang="en-US"/>
           </a:p>
@@ -3254,7 +3256,7 @@
           <a:p>
             <a:fld id="{B60C387C-249C-E74C-AA9C-592306AF9B93}" type="datetimeFigureOut">
               <a:rPr lang="en-US" smtClean="0"/>
-              <a:t>4/26/22</a:t>
+              <a:t>5/10/22</a:t>
             </a:fld>
             <a:endParaRPr lang="en-US"/>
           </a:p>
@@ -3467,7 +3469,7 @@
           <a:p>
             <a:fld id="{B60C387C-249C-E74C-AA9C-592306AF9B93}" type="datetimeFigureOut">
               <a:rPr lang="en-US" smtClean="0"/>
-              <a:t>4/26/22</a:t>
+              <a:t>5/10/22</a:t>
             </a:fld>
             <a:endParaRPr lang="en-US"/>
           </a:p>
@@ -5456,7 +5458,7 @@
                 <a:ea typeface="Amazon Ember" panose="020B0603020204020204" pitchFamily="34" charset="0"/>
                 <a:cs typeface="Arial" panose="020B0604020202020204" pitchFamily="34" charset="0"/>
               </a:rPr>
-              <a:t>ACM Bucket</a:t>
+              <a:t>AMC Bucket</a:t>
             </a:r>
           </a:p>
         </p:txBody>
@@ -26221,6 +26223,2024 @@
     <p:extLst>
       <p:ext uri="{BB962C8B-B14F-4D97-AF65-F5344CB8AC3E}">
         <p14:creationId xmlns:p14="http://schemas.microsoft.com/office/powerpoint/2010/main" val="2222154213"/>
+      </p:ext>
+    </p:extLst>
+  </p:cSld>
+  <p:clrMapOvr>
+    <a:masterClrMapping/>
+  </p:clrMapOvr>
+</p:sld>
+</file>
+
+<file path=ppt/slides/slide5.xml><?xml version="1.0" encoding="utf-8"?>
+<p:sld xmlns:a="http://schemas.openxmlformats.org/drawingml/2006/main" xmlns:r="http://schemas.openxmlformats.org/officeDocument/2006/relationships" xmlns:p="http://schemas.openxmlformats.org/presentationml/2006/main">
+  <p:cSld>
+    <p:spTree>
+      <p:nvGrpSpPr>
+        <p:cNvPr id="1" name=""/>
+        <p:cNvGrpSpPr/>
+        <p:nvPr/>
+      </p:nvGrpSpPr>
+      <p:grpSpPr>
+        <a:xfrm>
+          <a:off x="0" y="0"/>
+          <a:ext cx="0" cy="0"/>
+          <a:chOff x="0" y="0"/>
+          <a:chExt cx="0" cy="0"/>
+        </a:xfrm>
+      </p:grpSpPr>
+      <p:sp>
+        <p:nvSpPr>
+          <p:cNvPr id="15" name="TextBox 9">
+            <a:extLst>
+              <a:ext uri="{FF2B5EF4-FFF2-40B4-BE49-F238E27FC236}">
+                <a16:creationId xmlns:a16="http://schemas.microsoft.com/office/drawing/2014/main" id="{99C19F51-444E-244D-9BFC-52D3242BEAD4}"/>
+              </a:ext>
+            </a:extLst>
+          </p:cNvPr>
+          <p:cNvSpPr txBox="1">
+            <a:spLocks noChangeArrowheads="1"/>
+          </p:cNvSpPr>
+          <p:nvPr/>
+        </p:nvSpPr>
+        <p:spPr bwMode="auto">
+          <a:xfrm>
+            <a:off x="9451310" y="4908236"/>
+            <a:ext cx="4205882" cy="438582"/>
+          </a:xfrm>
+          <a:prstGeom prst="rect">
+            <a:avLst/>
+          </a:prstGeom>
+          <a:noFill/>
+          <a:ln>
+            <a:noFill/>
+          </a:ln>
+          <a:extLst>
+            <a:ext uri="{909E8E84-426E-40DD-AFC4-6F175D3DCCD1}">
+              <a14:hiddenFill xmlns:a14="http://schemas.microsoft.com/office/drawing/2010/main">
+                <a:solidFill>
+                  <a:srgbClr val="FFFFFF"/>
+                </a:solidFill>
+              </a14:hiddenFill>
+            </a:ext>
+            <a:ext uri="{91240B29-F687-4F45-9708-019B960494DF}">
+              <a14:hiddenLine xmlns:a14="http://schemas.microsoft.com/office/drawing/2010/main" w="9525">
+                <a:solidFill>
+                  <a:srgbClr val="000000"/>
+                </a:solidFill>
+                <a:miter lim="800000"/>
+                <a:headEnd/>
+                <a:tailEnd/>
+              </a14:hiddenLine>
+            </a:ext>
+          </a:extLst>
+        </p:spPr>
+        <p:txBody>
+          <a:bodyPr>
+            <a:spAutoFit/>
+          </a:bodyPr>
+          <a:lstStyle>
+            <a:lvl1pPr>
+              <a:defRPr>
+                <a:solidFill>
+                  <a:schemeClr val="tx1"/>
+                </a:solidFill>
+                <a:latin typeface="Calibri" panose="020F0502020204030204" pitchFamily="34" charset="0"/>
+              </a:defRPr>
+            </a:lvl1pPr>
+            <a:lvl2pPr marL="742950" indent="-285750">
+              <a:defRPr>
+                <a:solidFill>
+                  <a:schemeClr val="tx1"/>
+                </a:solidFill>
+                <a:latin typeface="Calibri" panose="020F0502020204030204" pitchFamily="34" charset="0"/>
+              </a:defRPr>
+            </a:lvl2pPr>
+            <a:lvl3pPr marL="1143000" indent="-228600">
+              <a:defRPr>
+                <a:solidFill>
+                  <a:schemeClr val="tx1"/>
+                </a:solidFill>
+                <a:latin typeface="Calibri" panose="020F0502020204030204" pitchFamily="34" charset="0"/>
+              </a:defRPr>
+            </a:lvl3pPr>
+            <a:lvl4pPr marL="1600200" indent="-228600">
+              <a:defRPr>
+                <a:solidFill>
+                  <a:schemeClr val="tx1"/>
+                </a:solidFill>
+                <a:latin typeface="Calibri" panose="020F0502020204030204" pitchFamily="34" charset="0"/>
+              </a:defRPr>
+            </a:lvl4pPr>
+            <a:lvl5pPr marL="2057400" indent="-228600">
+              <a:defRPr>
+                <a:solidFill>
+                  <a:schemeClr val="tx1"/>
+                </a:solidFill>
+                <a:latin typeface="Calibri" panose="020F0502020204030204" pitchFamily="34" charset="0"/>
+              </a:defRPr>
+            </a:lvl5pPr>
+            <a:lvl6pPr marL="2514600" indent="-228600" eaLnBrk="0" fontAlgn="base" hangingPunct="0">
+              <a:spcBef>
+                <a:spcPct val="0"/>
+              </a:spcBef>
+              <a:spcAft>
+                <a:spcPct val="0"/>
+              </a:spcAft>
+              <a:defRPr>
+                <a:solidFill>
+                  <a:schemeClr val="tx1"/>
+                </a:solidFill>
+                <a:latin typeface="Calibri" panose="020F0502020204030204" pitchFamily="34" charset="0"/>
+              </a:defRPr>
+            </a:lvl6pPr>
+            <a:lvl7pPr marL="2971800" indent="-228600" eaLnBrk="0" fontAlgn="base" hangingPunct="0">
+              <a:spcBef>
+                <a:spcPct val="0"/>
+              </a:spcBef>
+              <a:spcAft>
+                <a:spcPct val="0"/>
+              </a:spcAft>
+              <a:defRPr>
+                <a:solidFill>
+                  <a:schemeClr val="tx1"/>
+                </a:solidFill>
+                <a:latin typeface="Calibri" panose="020F0502020204030204" pitchFamily="34" charset="0"/>
+              </a:defRPr>
+            </a:lvl7pPr>
+            <a:lvl8pPr marL="3429000" indent="-228600" eaLnBrk="0" fontAlgn="base" hangingPunct="0">
+              <a:spcBef>
+                <a:spcPct val="0"/>
+              </a:spcBef>
+              <a:spcAft>
+                <a:spcPct val="0"/>
+              </a:spcAft>
+              <a:defRPr>
+                <a:solidFill>
+                  <a:schemeClr val="tx1"/>
+                </a:solidFill>
+                <a:latin typeface="Calibri" panose="020F0502020204030204" pitchFamily="34" charset="0"/>
+              </a:defRPr>
+            </a:lvl8pPr>
+            <a:lvl9pPr marL="3886200" indent="-228600" eaLnBrk="0" fontAlgn="base" hangingPunct="0">
+              <a:spcBef>
+                <a:spcPct val="0"/>
+              </a:spcBef>
+              <a:spcAft>
+                <a:spcPct val="0"/>
+              </a:spcAft>
+              <a:defRPr>
+                <a:solidFill>
+                  <a:schemeClr val="tx1"/>
+                </a:solidFill>
+                <a:latin typeface="Calibri" panose="020F0502020204030204" pitchFamily="34" charset="0"/>
+              </a:defRPr>
+            </a:lvl9pPr>
+          </a:lstStyle>
+          <a:p>
+            <a:pPr algn="ctr" eaLnBrk="1" hangingPunct="1"/>
+            <a:r>
+              <a:rPr lang="en-US" altLang="en-US" sz="2250" i="1" dirty="0">
+                <a:latin typeface="Amazon Ember" panose="020B0603020204020204" pitchFamily="34" charset="0"/>
+                <a:ea typeface="Amazon Ember" panose="020B0603020204020204" pitchFamily="34" charset="0"/>
+                <a:cs typeface="Amazon Ember" panose="020B0603020204020204" pitchFamily="34" charset="0"/>
+              </a:rPr>
+              <a:t>make delete_all </a:t>
+            </a:r>
+          </a:p>
+        </p:txBody>
+      </p:sp>
+      <p:grpSp>
+        <p:nvGrpSpPr>
+          <p:cNvPr id="16" name="Group 28">
+            <a:extLst>
+              <a:ext uri="{FF2B5EF4-FFF2-40B4-BE49-F238E27FC236}">
+                <a16:creationId xmlns:a16="http://schemas.microsoft.com/office/drawing/2014/main" id="{97333D0F-FD4F-8843-BAD7-F5DF8AA6786D}"/>
+              </a:ext>
+            </a:extLst>
+          </p:cNvPr>
+          <p:cNvGrpSpPr>
+            <a:grpSpLocks/>
+          </p:cNvGrpSpPr>
+          <p:nvPr/>
+        </p:nvGrpSpPr>
+        <p:grpSpPr bwMode="auto">
+          <a:xfrm rot="16200000">
+            <a:off x="10662286" y="-2555668"/>
+            <a:ext cx="1496016" cy="17499724"/>
+            <a:chOff x="2488530" y="-1695049"/>
+            <a:chExt cx="797510" cy="9056065"/>
+          </a:xfrm>
+        </p:grpSpPr>
+        <p:sp>
+          <p:nvSpPr>
+            <p:cNvPr id="17" name="Freeform 16">
+              <a:extLst>
+                <a:ext uri="{FF2B5EF4-FFF2-40B4-BE49-F238E27FC236}">
+                  <a16:creationId xmlns:a16="http://schemas.microsoft.com/office/drawing/2014/main" id="{AFF59B57-4521-C84F-AC72-621B7CA2194B}"/>
+                </a:ext>
+              </a:extLst>
+            </p:cNvPr>
+            <p:cNvSpPr/>
+            <p:nvPr/>
+          </p:nvSpPr>
+          <p:spPr>
+            <a:xfrm>
+              <a:off x="2488530" y="-1695049"/>
+              <a:ext cx="425685" cy="9056065"/>
+            </a:xfrm>
+            <a:custGeom>
+              <a:avLst/>
+              <a:gdLst>
+                <a:gd name="connsiteX0" fmla="*/ 0 w 622300"/>
+                <a:gd name="connsiteY0" fmla="*/ 0 h 1574800"/>
+                <a:gd name="connsiteX1" fmla="*/ 622300 w 622300"/>
+                <a:gd name="connsiteY1" fmla="*/ 0 h 1574800"/>
+                <a:gd name="connsiteX2" fmla="*/ 622300 w 622300"/>
+                <a:gd name="connsiteY2" fmla="*/ 1574800 h 1574800"/>
+                <a:gd name="connsiteX3" fmla="*/ 482600 w 622300"/>
+                <a:gd name="connsiteY3" fmla="*/ 1574800 h 1574800"/>
+                <a:gd name="connsiteX4" fmla="*/ 0 w 622300"/>
+                <a:gd name="connsiteY4" fmla="*/ 1574800 h 1574800"/>
+              </a:gdLst>
+              <a:ahLst/>
+              <a:cxnLst>
+                <a:cxn ang="0">
+                  <a:pos x="connsiteX0" y="connsiteY0"/>
+                </a:cxn>
+                <a:cxn ang="0">
+                  <a:pos x="connsiteX1" y="connsiteY1"/>
+                </a:cxn>
+                <a:cxn ang="0">
+                  <a:pos x="connsiteX2" y="connsiteY2"/>
+                </a:cxn>
+                <a:cxn ang="0">
+                  <a:pos x="connsiteX3" y="connsiteY3"/>
+                </a:cxn>
+                <a:cxn ang="0">
+                  <a:pos x="connsiteX4" y="connsiteY4"/>
+                </a:cxn>
+              </a:cxnLst>
+              <a:rect l="l" t="t" r="r" b="b"/>
+              <a:pathLst>
+                <a:path w="622300" h="1574800">
+                  <a:moveTo>
+                    <a:pt x="0" y="0"/>
+                  </a:moveTo>
+                  <a:lnTo>
+                    <a:pt x="622300" y="0"/>
+                  </a:lnTo>
+                  <a:lnTo>
+                    <a:pt x="622300" y="1574800"/>
+                  </a:lnTo>
+                  <a:lnTo>
+                    <a:pt x="482600" y="1574800"/>
+                  </a:lnTo>
+                  <a:lnTo>
+                    <a:pt x="0" y="1574800"/>
+                  </a:lnTo>
+                </a:path>
+              </a:pathLst>
+            </a:custGeom>
+            <a:noFill/>
+            <a:ln w="12700">
+              <a:solidFill>
+                <a:schemeClr val="tx2"/>
+              </a:solidFill>
+            </a:ln>
+          </p:spPr>
+          <p:style>
+            <a:lnRef idx="2">
+              <a:schemeClr val="accent1">
+                <a:shade val="50000"/>
+              </a:schemeClr>
+            </a:lnRef>
+            <a:fillRef idx="1">
+              <a:schemeClr val="accent1"/>
+            </a:fillRef>
+            <a:effectRef idx="0">
+              <a:schemeClr val="accent1"/>
+            </a:effectRef>
+            <a:fontRef idx="minor">
+              <a:schemeClr val="lt1"/>
+            </a:fontRef>
+          </p:style>
+          <p:txBody>
+            <a:bodyPr anchor="ctr"/>
+            <a:lstStyle/>
+            <a:p>
+              <a:pPr algn="ctr">
+                <a:defRPr/>
+              </a:pPr>
+              <a:endParaRPr lang="en-US" sz="3375" dirty="0">
+                <a:latin typeface="Amazon Ember" panose="020B0603020204020204" pitchFamily="34" charset="0"/>
+                <a:ea typeface="Amazon Ember" panose="020B0603020204020204" pitchFamily="34" charset="0"/>
+                <a:cs typeface="Amazon Ember" panose="020B0603020204020204" pitchFamily="34" charset="0"/>
+              </a:endParaRPr>
+            </a:p>
+          </p:txBody>
+        </p:sp>
+        <p:cxnSp>
+          <p:nvCxnSpPr>
+            <p:cNvPr id="18" name="Straight Arrow Connector 17">
+              <a:extLst>
+                <a:ext uri="{FF2B5EF4-FFF2-40B4-BE49-F238E27FC236}">
+                  <a16:creationId xmlns:a16="http://schemas.microsoft.com/office/drawing/2014/main" id="{BA22D390-C417-7C42-9A58-8306322DD7DE}"/>
+                </a:ext>
+              </a:extLst>
+            </p:cNvPr>
+            <p:cNvCxnSpPr>
+              <a:cxnSpLocks/>
+            </p:cNvCxnSpPr>
+            <p:nvPr/>
+          </p:nvCxnSpPr>
+          <p:spPr>
+            <a:xfrm rot="5400000" flipV="1">
+              <a:off x="3118781" y="2740222"/>
+              <a:ext cx="0" cy="334518"/>
+            </a:xfrm>
+            <a:prstGeom prst="straightConnector1">
+              <a:avLst/>
+            </a:prstGeom>
+            <a:ln w="12700">
+              <a:solidFill>
+                <a:srgbClr val="545B64"/>
+              </a:solidFill>
+              <a:headEnd type="none" w="med" len="sm"/>
+              <a:tailEnd type="none" w="med" len="sm"/>
+            </a:ln>
+          </p:spPr>
+          <p:style>
+            <a:lnRef idx="1">
+              <a:schemeClr val="accent1"/>
+            </a:lnRef>
+            <a:fillRef idx="0">
+              <a:schemeClr val="accent1"/>
+            </a:fillRef>
+            <a:effectRef idx="0">
+              <a:schemeClr val="accent1"/>
+            </a:effectRef>
+            <a:fontRef idx="minor">
+              <a:schemeClr val="tx1"/>
+            </a:fontRef>
+          </p:style>
+        </p:cxnSp>
+      </p:grpSp>
+      <p:cxnSp>
+        <p:nvCxnSpPr>
+          <p:cNvPr id="19" name="Straight Arrow Connector 18">
+            <a:extLst>
+              <a:ext uri="{FF2B5EF4-FFF2-40B4-BE49-F238E27FC236}">
+                <a16:creationId xmlns:a16="http://schemas.microsoft.com/office/drawing/2014/main" id="{96AD0A76-4882-F742-B5C6-52218934F56D}"/>
+              </a:ext>
+            </a:extLst>
+          </p:cNvPr>
+          <p:cNvCxnSpPr>
+            <a:cxnSpLocks/>
+          </p:cNvCxnSpPr>
+          <p:nvPr/>
+        </p:nvCxnSpPr>
+        <p:spPr bwMode="auto">
+          <a:xfrm>
+            <a:off x="4560339" y="8990870"/>
+            <a:ext cx="585568" cy="2"/>
+          </a:xfrm>
+          <a:prstGeom prst="straightConnector1">
+            <a:avLst/>
+          </a:prstGeom>
+          <a:ln w="12700">
+            <a:solidFill>
+              <a:schemeClr val="tx1"/>
+            </a:solidFill>
+            <a:headEnd type="none" w="med" len="sm"/>
+            <a:tailEnd type="arrow" w="med" len="sm"/>
+          </a:ln>
+        </p:spPr>
+        <p:style>
+          <a:lnRef idx="1">
+            <a:schemeClr val="accent1"/>
+          </a:lnRef>
+          <a:fillRef idx="0">
+            <a:schemeClr val="accent1"/>
+          </a:fillRef>
+          <a:effectRef idx="0">
+            <a:schemeClr val="accent1"/>
+          </a:effectRef>
+          <a:fontRef idx="minor">
+            <a:schemeClr val="tx1"/>
+          </a:fontRef>
+        </p:style>
+      </p:cxnSp>
+      <p:pic>
+        <p:nvPicPr>
+          <p:cNvPr id="28" name="Picture 27">
+            <a:extLst>
+              <a:ext uri="{FF2B5EF4-FFF2-40B4-BE49-F238E27FC236}">
+                <a16:creationId xmlns:a16="http://schemas.microsoft.com/office/drawing/2014/main" id="{30DF230F-DDB5-E547-8B34-C5B873834725}"/>
+              </a:ext>
+            </a:extLst>
+          </p:cNvPr>
+          <p:cNvPicPr>
+            <a:picLocks noChangeAspect="1"/>
+          </p:cNvPicPr>
+          <p:nvPr/>
+        </p:nvPicPr>
+        <p:blipFill>
+          <a:blip r:embed="rId2"/>
+          <a:stretch>
+            <a:fillRect/>
+          </a:stretch>
+        </p:blipFill>
+        <p:spPr>
+          <a:xfrm>
+            <a:off x="11739172" y="3394287"/>
+            <a:ext cx="1579764" cy="1579764"/>
+          </a:xfrm>
+          <a:prstGeom prst="rect">
+            <a:avLst/>
+          </a:prstGeom>
+        </p:spPr>
+      </p:pic>
+      <p:pic>
+        <p:nvPicPr>
+          <p:cNvPr id="29" name="Picture 28">
+            <a:extLst>
+              <a:ext uri="{FF2B5EF4-FFF2-40B4-BE49-F238E27FC236}">
+                <a16:creationId xmlns:a16="http://schemas.microsoft.com/office/drawing/2014/main" id="{20C51B50-028C-0048-98ED-07EF6C543C84}"/>
+              </a:ext>
+            </a:extLst>
+          </p:cNvPr>
+          <p:cNvPicPr>
+            <a:picLocks noChangeAspect="1"/>
+          </p:cNvPicPr>
+          <p:nvPr/>
+        </p:nvPicPr>
+        <p:blipFill>
+          <a:blip r:embed="rId3"/>
+          <a:stretch>
+            <a:fillRect/>
+          </a:stretch>
+        </p:blipFill>
+        <p:spPr>
+          <a:xfrm>
+            <a:off x="9144747" y="2656799"/>
+            <a:ext cx="2704997" cy="2704997"/>
+          </a:xfrm>
+          <a:prstGeom prst="rect">
+            <a:avLst/>
+          </a:prstGeom>
+        </p:spPr>
+      </p:pic>
+      <p:sp>
+        <p:nvSpPr>
+          <p:cNvPr id="30" name="Rectangle 29">
+            <a:extLst>
+              <a:ext uri="{FF2B5EF4-FFF2-40B4-BE49-F238E27FC236}">
+                <a16:creationId xmlns:a16="http://schemas.microsoft.com/office/drawing/2014/main" id="{6CD78FB1-9A85-0247-B2AA-2D250E01E97C}"/>
+              </a:ext>
+            </a:extLst>
+          </p:cNvPr>
+          <p:cNvSpPr/>
+          <p:nvPr/>
+        </p:nvSpPr>
+        <p:spPr>
+          <a:xfrm>
+            <a:off x="1096734" y="7428412"/>
+            <a:ext cx="3122094" cy="3124913"/>
+          </a:xfrm>
+          <a:prstGeom prst="rect">
+            <a:avLst/>
+          </a:prstGeom>
+          <a:noFill/>
+          <a:ln w="12700">
+            <a:solidFill>
+              <a:srgbClr val="5A6B86"/>
+            </a:solidFill>
+            <a:prstDash val="dash"/>
+          </a:ln>
+        </p:spPr>
+        <p:style>
+          <a:lnRef idx="2">
+            <a:schemeClr val="accent1">
+              <a:shade val="50000"/>
+            </a:schemeClr>
+          </a:lnRef>
+          <a:fillRef idx="1">
+            <a:schemeClr val="accent1"/>
+          </a:fillRef>
+          <a:effectRef idx="0">
+            <a:schemeClr val="accent1"/>
+          </a:effectRef>
+          <a:fontRef idx="minor">
+            <a:schemeClr val="lt1"/>
+          </a:fontRef>
+        </p:style>
+        <p:txBody>
+          <a:bodyPr tIns="171450"/>
+          <a:lstStyle/>
+          <a:p>
+            <a:pPr algn="ctr">
+              <a:defRPr/>
+            </a:pPr>
+            <a:r>
+              <a:rPr lang="en-US" sz="2250" dirty="0">
+                <a:solidFill>
+                  <a:srgbClr val="5A6B86"/>
+                </a:solidFill>
+                <a:latin typeface="Amazon Ember" panose="020B0603020204020204" pitchFamily="34" charset="0"/>
+                <a:ea typeface="Amazon Ember" panose="020B0603020204020204" pitchFamily="34" charset="0"/>
+                <a:cs typeface="Amazon Ember" panose="020B0603020204020204" pitchFamily="34" charset="0"/>
+              </a:rPr>
+              <a:t>Empty S3 Buckets</a:t>
+            </a:r>
+          </a:p>
+        </p:txBody>
+      </p:sp>
+      <p:cxnSp>
+        <p:nvCxnSpPr>
+          <p:cNvPr id="42" name="Straight Arrow Connector 41">
+            <a:extLst>
+              <a:ext uri="{FF2B5EF4-FFF2-40B4-BE49-F238E27FC236}">
+                <a16:creationId xmlns:a16="http://schemas.microsoft.com/office/drawing/2014/main" id="{A62259B4-E41E-6F43-9A31-6B47D07FD3AE}"/>
+              </a:ext>
+            </a:extLst>
+          </p:cNvPr>
+          <p:cNvCxnSpPr>
+            <a:cxnSpLocks/>
+          </p:cNvCxnSpPr>
+          <p:nvPr/>
+        </p:nvCxnSpPr>
+        <p:spPr bwMode="auto">
+          <a:xfrm>
+            <a:off x="8952466" y="8996243"/>
+            <a:ext cx="585568" cy="2"/>
+          </a:xfrm>
+          <a:prstGeom prst="straightConnector1">
+            <a:avLst/>
+          </a:prstGeom>
+          <a:ln w="12700">
+            <a:solidFill>
+              <a:schemeClr val="tx1"/>
+            </a:solidFill>
+            <a:headEnd type="none" w="med" len="sm"/>
+            <a:tailEnd type="arrow" w="med" len="sm"/>
+          </a:ln>
+        </p:spPr>
+        <p:style>
+          <a:lnRef idx="1">
+            <a:schemeClr val="accent1"/>
+          </a:lnRef>
+          <a:fillRef idx="0">
+            <a:schemeClr val="accent1"/>
+          </a:fillRef>
+          <a:effectRef idx="0">
+            <a:schemeClr val="accent1"/>
+          </a:effectRef>
+          <a:fontRef idx="minor">
+            <a:schemeClr val="tx1"/>
+          </a:fontRef>
+        </p:style>
+      </p:cxnSp>
+      <p:sp>
+        <p:nvSpPr>
+          <p:cNvPr id="43" name="Rectangle 42">
+            <a:extLst>
+              <a:ext uri="{FF2B5EF4-FFF2-40B4-BE49-F238E27FC236}">
+                <a16:creationId xmlns:a16="http://schemas.microsoft.com/office/drawing/2014/main" id="{C535ACEF-DE36-2D42-B25B-21C7502C34C2}"/>
+              </a:ext>
+            </a:extLst>
+          </p:cNvPr>
+          <p:cNvSpPr/>
+          <p:nvPr/>
+        </p:nvSpPr>
+        <p:spPr>
+          <a:xfrm>
+            <a:off x="5494587" y="7428412"/>
+            <a:ext cx="3122094" cy="3124913"/>
+          </a:xfrm>
+          <a:prstGeom prst="rect">
+            <a:avLst/>
+          </a:prstGeom>
+          <a:noFill/>
+          <a:ln w="12700">
+            <a:solidFill>
+              <a:srgbClr val="5A6B86"/>
+            </a:solidFill>
+            <a:prstDash val="dash"/>
+          </a:ln>
+        </p:spPr>
+        <p:style>
+          <a:lnRef idx="2">
+            <a:schemeClr val="accent1">
+              <a:shade val="50000"/>
+            </a:schemeClr>
+          </a:lnRef>
+          <a:fillRef idx="1">
+            <a:schemeClr val="accent1"/>
+          </a:fillRef>
+          <a:effectRef idx="0">
+            <a:schemeClr val="accent1"/>
+          </a:effectRef>
+          <a:fontRef idx="minor">
+            <a:schemeClr val="lt1"/>
+          </a:fontRef>
+        </p:style>
+        <p:txBody>
+          <a:bodyPr tIns="171450"/>
+          <a:lstStyle/>
+          <a:p>
+            <a:pPr algn="ctr">
+              <a:defRPr/>
+            </a:pPr>
+            <a:r>
+              <a:rPr lang="en-US" sz="2250" dirty="0">
+                <a:solidFill>
+                  <a:srgbClr val="5A6B86"/>
+                </a:solidFill>
+                <a:latin typeface="Amazon Ember" panose="020B0603020204020204" pitchFamily="34" charset="0"/>
+                <a:ea typeface="Amazon Ember" panose="020B0603020204020204" pitchFamily="34" charset="0"/>
+                <a:cs typeface="Amazon Ember" panose="020B0603020204020204" pitchFamily="34" charset="0"/>
+              </a:rPr>
+              <a:t>Delete </a:t>
+            </a:r>
+            <a:r>
+              <a:rPr lang="en-US" sz="2250">
+                <a:solidFill>
+                  <a:srgbClr val="5A6B86"/>
+                </a:solidFill>
+                <a:latin typeface="Amazon Ember" panose="020B0603020204020204" pitchFamily="34" charset="0"/>
+                <a:ea typeface="Amazon Ember" panose="020B0603020204020204" pitchFamily="34" charset="0"/>
+                <a:cs typeface="Amazon Ember" panose="020B0603020204020204" pitchFamily="34" charset="0"/>
+              </a:rPr>
+              <a:t>AMC QuickStart </a:t>
+            </a:r>
+            <a:r>
+              <a:rPr lang="en-US" sz="2250" dirty="0">
+                <a:solidFill>
+                  <a:srgbClr val="5A6B86"/>
+                </a:solidFill>
+                <a:latin typeface="Amazon Ember" panose="020B0603020204020204" pitchFamily="34" charset="0"/>
+                <a:ea typeface="Amazon Ember" panose="020B0603020204020204" pitchFamily="34" charset="0"/>
+                <a:cs typeface="Amazon Ember" panose="020B0603020204020204" pitchFamily="34" charset="0"/>
+              </a:rPr>
+              <a:t>Stacks</a:t>
+            </a:r>
+          </a:p>
+        </p:txBody>
+      </p:sp>
+      <p:cxnSp>
+        <p:nvCxnSpPr>
+          <p:cNvPr id="46" name="Straight Arrow Connector 45">
+            <a:extLst>
+              <a:ext uri="{FF2B5EF4-FFF2-40B4-BE49-F238E27FC236}">
+                <a16:creationId xmlns:a16="http://schemas.microsoft.com/office/drawing/2014/main" id="{8F988AE8-2D7B-E64F-9D6E-E5011D4CEDBD}"/>
+              </a:ext>
+            </a:extLst>
+          </p:cNvPr>
+          <p:cNvCxnSpPr>
+            <a:cxnSpLocks/>
+          </p:cNvCxnSpPr>
+          <p:nvPr/>
+        </p:nvCxnSpPr>
+        <p:spPr bwMode="auto">
+          <a:xfrm>
+            <a:off x="13318936" y="8990870"/>
+            <a:ext cx="585568" cy="2"/>
+          </a:xfrm>
+          <a:prstGeom prst="straightConnector1">
+            <a:avLst/>
+          </a:prstGeom>
+          <a:ln w="12700">
+            <a:solidFill>
+              <a:schemeClr val="tx1"/>
+            </a:solidFill>
+            <a:headEnd type="none" w="med" len="sm"/>
+            <a:tailEnd type="arrow" w="med" len="sm"/>
+          </a:ln>
+        </p:spPr>
+        <p:style>
+          <a:lnRef idx="1">
+            <a:schemeClr val="accent1"/>
+          </a:lnRef>
+          <a:fillRef idx="0">
+            <a:schemeClr val="accent1"/>
+          </a:fillRef>
+          <a:effectRef idx="0">
+            <a:schemeClr val="accent1"/>
+          </a:effectRef>
+          <a:fontRef idx="minor">
+            <a:schemeClr val="tx1"/>
+          </a:fontRef>
+        </p:style>
+      </p:cxnSp>
+      <p:sp>
+        <p:nvSpPr>
+          <p:cNvPr id="47" name="Rectangle 46">
+            <a:extLst>
+              <a:ext uri="{FF2B5EF4-FFF2-40B4-BE49-F238E27FC236}">
+                <a16:creationId xmlns:a16="http://schemas.microsoft.com/office/drawing/2014/main" id="{5805DB0A-45BD-F94F-884F-BA2FDA774516}"/>
+              </a:ext>
+            </a:extLst>
+          </p:cNvPr>
+          <p:cNvSpPr/>
+          <p:nvPr/>
+        </p:nvSpPr>
+        <p:spPr>
+          <a:xfrm>
+            <a:off x="9848161" y="7428412"/>
+            <a:ext cx="3122094" cy="3124913"/>
+          </a:xfrm>
+          <a:prstGeom prst="rect">
+            <a:avLst/>
+          </a:prstGeom>
+          <a:noFill/>
+          <a:ln w="12700">
+            <a:solidFill>
+              <a:srgbClr val="5A6B86"/>
+            </a:solidFill>
+            <a:prstDash val="dash"/>
+          </a:ln>
+        </p:spPr>
+        <p:style>
+          <a:lnRef idx="2">
+            <a:schemeClr val="accent1">
+              <a:shade val="50000"/>
+            </a:schemeClr>
+          </a:lnRef>
+          <a:fillRef idx="1">
+            <a:schemeClr val="accent1"/>
+          </a:fillRef>
+          <a:effectRef idx="0">
+            <a:schemeClr val="accent1"/>
+          </a:effectRef>
+          <a:fontRef idx="minor">
+            <a:schemeClr val="lt1"/>
+          </a:fontRef>
+        </p:style>
+        <p:txBody>
+          <a:bodyPr tIns="171450"/>
+          <a:lstStyle/>
+          <a:p>
+            <a:pPr algn="ctr">
+              <a:defRPr/>
+            </a:pPr>
+            <a:r>
+              <a:rPr lang="en-US" sz="2250" dirty="0">
+                <a:solidFill>
+                  <a:srgbClr val="5A6B86"/>
+                </a:solidFill>
+                <a:latin typeface="Amazon Ember" panose="020B0603020204020204" pitchFamily="34" charset="0"/>
+                <a:ea typeface="Amazon Ember" panose="020B0603020204020204" pitchFamily="34" charset="0"/>
+                <a:cs typeface="Amazon Ember" panose="020B0603020204020204" pitchFamily="34" charset="0"/>
+              </a:rPr>
+              <a:t>Delete DDK Bootstrap</a:t>
+            </a:r>
+          </a:p>
+        </p:txBody>
+      </p:sp>
+      <p:cxnSp>
+        <p:nvCxnSpPr>
+          <p:cNvPr id="50" name="Straight Arrow Connector 49">
+            <a:extLst>
+              <a:ext uri="{FF2B5EF4-FFF2-40B4-BE49-F238E27FC236}">
+                <a16:creationId xmlns:a16="http://schemas.microsoft.com/office/drawing/2014/main" id="{875B3AFF-7262-4542-82EC-C149BDEFAE13}"/>
+              </a:ext>
+            </a:extLst>
+          </p:cNvPr>
+          <p:cNvCxnSpPr>
+            <a:cxnSpLocks/>
+          </p:cNvCxnSpPr>
+          <p:nvPr/>
+        </p:nvCxnSpPr>
+        <p:spPr bwMode="auto">
+          <a:xfrm>
+            <a:off x="17672394" y="8990868"/>
+            <a:ext cx="585568" cy="2"/>
+          </a:xfrm>
+          <a:prstGeom prst="straightConnector1">
+            <a:avLst/>
+          </a:prstGeom>
+          <a:ln w="12700">
+            <a:solidFill>
+              <a:schemeClr val="tx1"/>
+            </a:solidFill>
+            <a:headEnd type="none" w="med" len="sm"/>
+            <a:tailEnd type="arrow" w="med" len="sm"/>
+          </a:ln>
+        </p:spPr>
+        <p:style>
+          <a:lnRef idx="1">
+            <a:schemeClr val="accent1"/>
+          </a:lnRef>
+          <a:fillRef idx="0">
+            <a:schemeClr val="accent1"/>
+          </a:fillRef>
+          <a:effectRef idx="0">
+            <a:schemeClr val="accent1"/>
+          </a:effectRef>
+          <a:fontRef idx="minor">
+            <a:schemeClr val="tx1"/>
+          </a:fontRef>
+        </p:style>
+      </p:cxnSp>
+      <p:sp>
+        <p:nvSpPr>
+          <p:cNvPr id="51" name="Rectangle 50">
+            <a:extLst>
+              <a:ext uri="{FF2B5EF4-FFF2-40B4-BE49-F238E27FC236}">
+                <a16:creationId xmlns:a16="http://schemas.microsoft.com/office/drawing/2014/main" id="{927D7AF2-65F5-8546-8F04-FA4CEA053EE3}"/>
+              </a:ext>
+            </a:extLst>
+          </p:cNvPr>
+          <p:cNvSpPr/>
+          <p:nvPr/>
+        </p:nvSpPr>
+        <p:spPr>
+          <a:xfrm>
+            <a:off x="14207885" y="7428412"/>
+            <a:ext cx="3122094" cy="3124913"/>
+          </a:xfrm>
+          <a:prstGeom prst="rect">
+            <a:avLst/>
+          </a:prstGeom>
+          <a:noFill/>
+          <a:ln w="12700">
+            <a:solidFill>
+              <a:srgbClr val="5A6B86"/>
+            </a:solidFill>
+            <a:prstDash val="dash"/>
+          </a:ln>
+        </p:spPr>
+        <p:style>
+          <a:lnRef idx="2">
+            <a:schemeClr val="accent1">
+              <a:shade val="50000"/>
+            </a:schemeClr>
+          </a:lnRef>
+          <a:fillRef idx="1">
+            <a:schemeClr val="accent1"/>
+          </a:fillRef>
+          <a:effectRef idx="0">
+            <a:schemeClr val="accent1"/>
+          </a:effectRef>
+          <a:fontRef idx="minor">
+            <a:schemeClr val="lt1"/>
+          </a:fontRef>
+        </p:style>
+        <p:txBody>
+          <a:bodyPr tIns="171450"/>
+          <a:lstStyle/>
+          <a:p>
+            <a:pPr algn="ctr">
+              <a:defRPr/>
+            </a:pPr>
+            <a:r>
+              <a:rPr lang="en-US" sz="2250" dirty="0">
+                <a:solidFill>
+                  <a:srgbClr val="5A6B86"/>
+                </a:solidFill>
+                <a:latin typeface="Amazon Ember" panose="020B0603020204020204" pitchFamily="34" charset="0"/>
+                <a:ea typeface="Amazon Ember" panose="020B0603020204020204" pitchFamily="34" charset="0"/>
+                <a:cs typeface="Amazon Ember" panose="020B0603020204020204" pitchFamily="34" charset="0"/>
+              </a:rPr>
+              <a:t>Delete CodeCommit Repository</a:t>
+            </a:r>
+          </a:p>
+        </p:txBody>
+      </p:sp>
+      <p:sp>
+        <p:nvSpPr>
+          <p:cNvPr id="55" name="Rectangle 54">
+            <a:extLst>
+              <a:ext uri="{FF2B5EF4-FFF2-40B4-BE49-F238E27FC236}">
+                <a16:creationId xmlns:a16="http://schemas.microsoft.com/office/drawing/2014/main" id="{EEA73B58-8080-FD4C-BE94-0444100CF719}"/>
+              </a:ext>
+            </a:extLst>
+          </p:cNvPr>
+          <p:cNvSpPr/>
+          <p:nvPr/>
+        </p:nvSpPr>
+        <p:spPr>
+          <a:xfrm>
+            <a:off x="18600376" y="7428412"/>
+            <a:ext cx="3122094" cy="3124913"/>
+          </a:xfrm>
+          <a:prstGeom prst="rect">
+            <a:avLst/>
+          </a:prstGeom>
+          <a:noFill/>
+          <a:ln w="12700">
+            <a:solidFill>
+              <a:srgbClr val="5A6B86"/>
+            </a:solidFill>
+            <a:prstDash val="dash"/>
+          </a:ln>
+        </p:spPr>
+        <p:style>
+          <a:lnRef idx="2">
+            <a:schemeClr val="accent1">
+              <a:shade val="50000"/>
+            </a:schemeClr>
+          </a:lnRef>
+          <a:fillRef idx="1">
+            <a:schemeClr val="accent1"/>
+          </a:fillRef>
+          <a:effectRef idx="0">
+            <a:schemeClr val="accent1"/>
+          </a:effectRef>
+          <a:fontRef idx="minor">
+            <a:schemeClr val="lt1"/>
+          </a:fontRef>
+        </p:style>
+        <p:txBody>
+          <a:bodyPr tIns="171450"/>
+          <a:lstStyle/>
+          <a:p>
+            <a:pPr algn="ctr">
+              <a:defRPr/>
+            </a:pPr>
+            <a:r>
+              <a:rPr lang="en-US" sz="2250" dirty="0">
+                <a:solidFill>
+                  <a:srgbClr val="5A6B86"/>
+                </a:solidFill>
+                <a:latin typeface="Amazon Ember" panose="020B0603020204020204" pitchFamily="34" charset="0"/>
+                <a:ea typeface="Amazon Ember" panose="020B0603020204020204" pitchFamily="34" charset="0"/>
+                <a:cs typeface="Amazon Ember" panose="020B0603020204020204" pitchFamily="34" charset="0"/>
+              </a:rPr>
+              <a:t>Delete Remaining Items</a:t>
+            </a:r>
+          </a:p>
+        </p:txBody>
+      </p:sp>
+      <p:sp>
+        <p:nvSpPr>
+          <p:cNvPr id="57" name="TextBox 56">
+            <a:extLst>
+              <a:ext uri="{FF2B5EF4-FFF2-40B4-BE49-F238E27FC236}">
+                <a16:creationId xmlns:a16="http://schemas.microsoft.com/office/drawing/2014/main" id="{BCEDD666-3EAC-1347-BC7F-30743E0B7738}"/>
+              </a:ext>
+            </a:extLst>
+          </p:cNvPr>
+          <p:cNvSpPr txBox="1"/>
+          <p:nvPr/>
+        </p:nvSpPr>
+        <p:spPr>
+          <a:xfrm>
+            <a:off x="18788817" y="8470876"/>
+            <a:ext cx="2742677" cy="1823576"/>
+          </a:xfrm>
+          <a:prstGeom prst="rect">
+            <a:avLst/>
+          </a:prstGeom>
+          <a:noFill/>
+          <a:ln>
+            <a:noFill/>
+          </a:ln>
+        </p:spPr>
+        <p:txBody>
+          <a:bodyPr wrap="square" rtlCol="0">
+            <a:spAutoFit/>
+          </a:bodyPr>
+          <a:lstStyle/>
+          <a:p>
+            <a:pPr marL="535781" indent="-535781">
+              <a:buFont typeface="Arial" panose="020B0604020202020204" pitchFamily="34" charset="0"/>
+              <a:buChar char="•"/>
+            </a:pPr>
+            <a:r>
+              <a:rPr lang="en-US" sz="1875" dirty="0">
+                <a:latin typeface="Amazon Ember" panose="020B0603020204020204" pitchFamily="34" charset="0"/>
+                <a:ea typeface="Amazon Ember" panose="020B0603020204020204" pitchFamily="34" charset="0"/>
+                <a:cs typeface="Amazon Ember" panose="020B0603020204020204" pitchFamily="34" charset="0"/>
+              </a:rPr>
+              <a:t>S3 Buckets</a:t>
+            </a:r>
+          </a:p>
+          <a:p>
+            <a:pPr marL="535781" indent="-535781">
+              <a:buFont typeface="Arial" panose="020B0604020202020204" pitchFamily="34" charset="0"/>
+              <a:buChar char="•"/>
+            </a:pPr>
+            <a:r>
+              <a:rPr lang="en-US" sz="1875" dirty="0">
+                <a:latin typeface="Amazon Ember" panose="020B0603020204020204" pitchFamily="34" charset="0"/>
+                <a:ea typeface="Amazon Ember" panose="020B0603020204020204" pitchFamily="34" charset="0"/>
+                <a:cs typeface="Amazon Ember" panose="020B0603020204020204" pitchFamily="34" charset="0"/>
+              </a:rPr>
+              <a:t>KMS Keys</a:t>
+            </a:r>
+          </a:p>
+          <a:p>
+            <a:pPr marL="535781" indent="-535781">
+              <a:buFont typeface="Arial" panose="020B0604020202020204" pitchFamily="34" charset="0"/>
+              <a:buChar char="•"/>
+            </a:pPr>
+            <a:r>
+              <a:rPr lang="en-US" sz="1875" dirty="0">
+                <a:latin typeface="Amazon Ember" panose="020B0603020204020204" pitchFamily="34" charset="0"/>
+                <a:ea typeface="Amazon Ember" panose="020B0603020204020204" pitchFamily="34" charset="0"/>
+                <a:cs typeface="Amazon Ember" panose="020B0603020204020204" pitchFamily="34" charset="0"/>
+              </a:rPr>
+              <a:t>Lambda Layers</a:t>
+            </a:r>
+          </a:p>
+          <a:p>
+            <a:pPr marL="535781" indent="-535781">
+              <a:buFont typeface="Arial" panose="020B0604020202020204" pitchFamily="34" charset="0"/>
+              <a:buChar char="•"/>
+            </a:pPr>
+            <a:r>
+              <a:rPr lang="en-US" sz="1875" dirty="0">
+                <a:latin typeface="Amazon Ember" panose="020B0603020204020204" pitchFamily="34" charset="0"/>
+                <a:ea typeface="Amazon Ember" panose="020B0603020204020204" pitchFamily="34" charset="0"/>
+                <a:cs typeface="Amazon Ember" panose="020B0603020204020204" pitchFamily="34" charset="0"/>
+              </a:rPr>
+              <a:t>TPS CFN Stack</a:t>
+            </a:r>
+          </a:p>
+          <a:p>
+            <a:pPr marL="535781" indent="-535781">
+              <a:buFont typeface="Arial" panose="020B0604020202020204" pitchFamily="34" charset="0"/>
+              <a:buChar char="•"/>
+            </a:pPr>
+            <a:r>
+              <a:rPr lang="en-US" sz="1875" dirty="0">
+                <a:latin typeface="Amazon Ember" panose="020B0603020204020204" pitchFamily="34" charset="0"/>
+                <a:ea typeface="Amazon Ember" panose="020B0603020204020204" pitchFamily="34" charset="0"/>
+                <a:cs typeface="Amazon Ember" panose="020B0603020204020204" pitchFamily="34" charset="0"/>
+              </a:rPr>
+              <a:t>WFM SQS Queues &amp; Rules</a:t>
+            </a:r>
+          </a:p>
+        </p:txBody>
+      </p:sp>
+      <p:sp>
+        <p:nvSpPr>
+          <p:cNvPr id="58" name="TextBox 57">
+            <a:extLst>
+              <a:ext uri="{FF2B5EF4-FFF2-40B4-BE49-F238E27FC236}">
+                <a16:creationId xmlns:a16="http://schemas.microsoft.com/office/drawing/2014/main" id="{68AC562E-DF5A-444B-AEC8-B165FA200673}"/>
+              </a:ext>
+            </a:extLst>
+          </p:cNvPr>
+          <p:cNvSpPr txBox="1"/>
+          <p:nvPr/>
+        </p:nvSpPr>
+        <p:spPr>
+          <a:xfrm>
+            <a:off x="9465712" y="2656798"/>
+            <a:ext cx="870751" cy="496290"/>
+          </a:xfrm>
+          <a:prstGeom prst="rect">
+            <a:avLst/>
+          </a:prstGeom>
+          <a:noFill/>
+        </p:spPr>
+        <p:txBody>
+          <a:bodyPr wrap="none" rtlCol="0">
+            <a:spAutoFit/>
+          </a:bodyPr>
+          <a:lstStyle/>
+          <a:p>
+            <a:r>
+              <a:rPr lang="en-US" sz="2625" dirty="0">
+                <a:latin typeface="Amazon Ember" panose="020B0603020204020204" pitchFamily="34" charset="0"/>
+                <a:ea typeface="Amazon Ember" panose="020B0603020204020204" pitchFamily="34" charset="0"/>
+                <a:cs typeface="Amazon Ember" panose="020B0603020204020204" pitchFamily="34" charset="0"/>
+              </a:rPr>
+              <a:t>User</a:t>
+            </a:r>
+          </a:p>
+        </p:txBody>
+      </p:sp>
+      <p:pic>
+        <p:nvPicPr>
+          <p:cNvPr id="61" name="Graphic 21">
+            <a:extLst>
+              <a:ext uri="{FF2B5EF4-FFF2-40B4-BE49-F238E27FC236}">
+                <a16:creationId xmlns:a16="http://schemas.microsoft.com/office/drawing/2014/main" id="{8F499F19-E8B4-A741-B6F0-32297B972C88}"/>
+              </a:ext>
+            </a:extLst>
+          </p:cNvPr>
+          <p:cNvPicPr>
+            <a:picLocks noChangeAspect="1" noChangeArrowheads="1"/>
+          </p:cNvPicPr>
+          <p:nvPr/>
+        </p:nvPicPr>
+        <p:blipFill>
+          <a:blip r:embed="rId4">
+            <a:extLst>
+              <a:ext uri="{28A0092B-C50C-407E-A947-70E740481C1C}">
+                <a14:useLocalDpi xmlns:a14="http://schemas.microsoft.com/office/drawing/2010/main" val="0"/>
+              </a:ext>
+            </a:extLst>
+          </a:blip>
+          <a:srcRect/>
+          <a:stretch>
+            <a:fillRect/>
+          </a:stretch>
+        </p:blipFill>
+        <p:spPr bwMode="auto">
+          <a:xfrm>
+            <a:off x="15235475" y="8559805"/>
+            <a:ext cx="1122703" cy="1122703"/>
+          </a:xfrm>
+          <a:prstGeom prst="rect">
+            <a:avLst/>
+          </a:prstGeom>
+          <a:noFill/>
+          <a:ln>
+            <a:noFill/>
+          </a:ln>
+          <a:extLst>
+            <a:ext uri="{909E8E84-426E-40DD-AFC4-6F175D3DCCD1}">
+              <a14:hiddenFill xmlns:a14="http://schemas.microsoft.com/office/drawing/2010/main">
+                <a:solidFill>
+                  <a:srgbClr val="FFFFFF"/>
+                </a:solidFill>
+              </a14:hiddenFill>
+            </a:ext>
+            <a:ext uri="{91240B29-F687-4F45-9708-019B960494DF}">
+              <a14:hiddenLine xmlns:a14="http://schemas.microsoft.com/office/drawing/2010/main" w="9525">
+                <a:solidFill>
+                  <a:srgbClr val="000000"/>
+                </a:solidFill>
+                <a:miter lim="800000"/>
+                <a:headEnd/>
+                <a:tailEnd/>
+              </a14:hiddenLine>
+            </a:ext>
+          </a:extLst>
+        </p:spPr>
+      </p:pic>
+      <p:pic>
+        <p:nvPicPr>
+          <p:cNvPr id="63" name="Graphic 8">
+            <a:extLst>
+              <a:ext uri="{FF2B5EF4-FFF2-40B4-BE49-F238E27FC236}">
+                <a16:creationId xmlns:a16="http://schemas.microsoft.com/office/drawing/2014/main" id="{15439E3B-C5D5-6545-A83F-060F53DCACF4}"/>
+              </a:ext>
+            </a:extLst>
+          </p:cNvPr>
+          <p:cNvPicPr>
+            <a:picLocks noChangeAspect="1" noChangeArrowheads="1"/>
+          </p:cNvPicPr>
+          <p:nvPr/>
+        </p:nvPicPr>
+        <p:blipFill>
+          <a:blip r:embed="rId5">
+            <a:extLst>
+              <a:ext uri="{28A0092B-C50C-407E-A947-70E740481C1C}">
+                <a14:useLocalDpi xmlns:a14="http://schemas.microsoft.com/office/drawing/2010/main" val="0"/>
+              </a:ext>
+            </a:extLst>
+          </a:blip>
+          <a:srcRect/>
+          <a:stretch>
+            <a:fillRect/>
+          </a:stretch>
+        </p:blipFill>
+        <p:spPr bwMode="auto">
+          <a:xfrm>
+            <a:off x="2095486" y="8559805"/>
+            <a:ext cx="1124586" cy="1124586"/>
+          </a:xfrm>
+          <a:prstGeom prst="rect">
+            <a:avLst/>
+          </a:prstGeom>
+          <a:noFill/>
+          <a:ln>
+            <a:noFill/>
+          </a:ln>
+          <a:extLst>
+            <a:ext uri="{909E8E84-426E-40DD-AFC4-6F175D3DCCD1}">
+              <a14:hiddenFill xmlns:a14="http://schemas.microsoft.com/office/drawing/2010/main">
+                <a:solidFill>
+                  <a:srgbClr val="FFFFFF"/>
+                </a:solidFill>
+              </a14:hiddenFill>
+            </a:ext>
+            <a:ext uri="{91240B29-F687-4F45-9708-019B960494DF}">
+              <a14:hiddenLine xmlns:a14="http://schemas.microsoft.com/office/drawing/2010/main" w="9525">
+                <a:solidFill>
+                  <a:srgbClr val="000000"/>
+                </a:solidFill>
+                <a:miter lim="800000"/>
+                <a:headEnd/>
+                <a:tailEnd/>
+              </a14:hiddenLine>
+            </a:ext>
+          </a:extLst>
+        </p:spPr>
+      </p:pic>
+      <p:pic>
+        <p:nvPicPr>
+          <p:cNvPr id="65" name="Graphic 21">
+            <a:extLst>
+              <a:ext uri="{FF2B5EF4-FFF2-40B4-BE49-F238E27FC236}">
+                <a16:creationId xmlns:a16="http://schemas.microsoft.com/office/drawing/2014/main" id="{D085160C-44EE-D64F-8883-50DC1267CB41}"/>
+              </a:ext>
+            </a:extLst>
+          </p:cNvPr>
+          <p:cNvPicPr>
+            <a:picLocks noChangeAspect="1" noChangeArrowheads="1"/>
+          </p:cNvPicPr>
+          <p:nvPr/>
+        </p:nvPicPr>
+        <p:blipFill>
+          <a:blip r:embed="rId6">
+            <a:extLst>
+              <a:ext uri="{28A0092B-C50C-407E-A947-70E740481C1C}">
+                <a14:useLocalDpi xmlns:a14="http://schemas.microsoft.com/office/drawing/2010/main" val="0"/>
+              </a:ext>
+            </a:extLst>
+          </a:blip>
+          <a:srcRect/>
+          <a:stretch>
+            <a:fillRect/>
+          </a:stretch>
+        </p:blipFill>
+        <p:spPr bwMode="auto">
+          <a:xfrm>
+            <a:off x="10880178" y="8554722"/>
+            <a:ext cx="1099644" cy="1099644"/>
+          </a:xfrm>
+          <a:prstGeom prst="rect">
+            <a:avLst/>
+          </a:prstGeom>
+          <a:noFill/>
+          <a:ln>
+            <a:noFill/>
+          </a:ln>
+          <a:extLst>
+            <a:ext uri="{909E8E84-426E-40DD-AFC4-6F175D3DCCD1}">
+              <a14:hiddenFill xmlns:a14="http://schemas.microsoft.com/office/drawing/2010/main">
+                <a:solidFill>
+                  <a:srgbClr val="FFFFFF"/>
+                </a:solidFill>
+              </a14:hiddenFill>
+            </a:ext>
+            <a:ext uri="{91240B29-F687-4F45-9708-019B960494DF}">
+              <a14:hiddenLine xmlns:a14="http://schemas.microsoft.com/office/drawing/2010/main" w="9525">
+                <a:solidFill>
+                  <a:srgbClr val="000000"/>
+                </a:solidFill>
+                <a:miter lim="800000"/>
+                <a:headEnd/>
+                <a:tailEnd/>
+              </a14:hiddenLine>
+            </a:ext>
+          </a:extLst>
+        </p:spPr>
+      </p:pic>
+      <p:sp>
+        <p:nvSpPr>
+          <p:cNvPr id="68" name="TextBox 12">
+            <a:extLst>
+              <a:ext uri="{FF2B5EF4-FFF2-40B4-BE49-F238E27FC236}">
+                <a16:creationId xmlns:a16="http://schemas.microsoft.com/office/drawing/2014/main" id="{EF071512-4655-E049-B7E7-DB75DDF8E16C}"/>
+              </a:ext>
+            </a:extLst>
+          </p:cNvPr>
+          <p:cNvSpPr txBox="1">
+            <a:spLocks noChangeArrowheads="1"/>
+          </p:cNvSpPr>
+          <p:nvPr/>
+        </p:nvSpPr>
+        <p:spPr bwMode="auto">
+          <a:xfrm>
+            <a:off x="4870402" y="9856973"/>
+            <a:ext cx="4274344" cy="438582"/>
+          </a:xfrm>
+          <a:prstGeom prst="rect">
+            <a:avLst/>
+          </a:prstGeom>
+          <a:noFill/>
+          <a:ln>
+            <a:noFill/>
+          </a:ln>
+          <a:extLst>
+            <a:ext uri="{909E8E84-426E-40DD-AFC4-6F175D3DCCD1}">
+              <a14:hiddenFill xmlns:a14="http://schemas.microsoft.com/office/drawing/2010/main">
+                <a:solidFill>
+                  <a:srgbClr val="FFFFFF"/>
+                </a:solidFill>
+              </a14:hiddenFill>
+            </a:ext>
+            <a:ext uri="{91240B29-F687-4F45-9708-019B960494DF}">
+              <a14:hiddenLine xmlns:a14="http://schemas.microsoft.com/office/drawing/2010/main" w="9525">
+                <a:solidFill>
+                  <a:srgbClr val="000000"/>
+                </a:solidFill>
+                <a:miter lim="800000"/>
+                <a:headEnd/>
+                <a:tailEnd/>
+              </a14:hiddenLine>
+            </a:ext>
+          </a:extLst>
+        </p:spPr>
+        <p:txBody>
+          <a:bodyPr>
+            <a:spAutoFit/>
+          </a:bodyPr>
+          <a:lstStyle>
+            <a:lvl1pPr>
+              <a:defRPr>
+                <a:solidFill>
+                  <a:schemeClr val="tx1"/>
+                </a:solidFill>
+                <a:latin typeface="Calibri" panose="020F0502020204030204" pitchFamily="34" charset="0"/>
+              </a:defRPr>
+            </a:lvl1pPr>
+            <a:lvl2pPr marL="742950" indent="-285750">
+              <a:defRPr>
+                <a:solidFill>
+                  <a:schemeClr val="tx1"/>
+                </a:solidFill>
+                <a:latin typeface="Calibri" panose="020F0502020204030204" pitchFamily="34" charset="0"/>
+              </a:defRPr>
+            </a:lvl2pPr>
+            <a:lvl3pPr marL="1143000" indent="-228600">
+              <a:defRPr>
+                <a:solidFill>
+                  <a:schemeClr val="tx1"/>
+                </a:solidFill>
+                <a:latin typeface="Calibri" panose="020F0502020204030204" pitchFamily="34" charset="0"/>
+              </a:defRPr>
+            </a:lvl3pPr>
+            <a:lvl4pPr marL="1600200" indent="-228600">
+              <a:defRPr>
+                <a:solidFill>
+                  <a:schemeClr val="tx1"/>
+                </a:solidFill>
+                <a:latin typeface="Calibri" panose="020F0502020204030204" pitchFamily="34" charset="0"/>
+              </a:defRPr>
+            </a:lvl4pPr>
+            <a:lvl5pPr marL="2057400" indent="-228600">
+              <a:defRPr>
+                <a:solidFill>
+                  <a:schemeClr val="tx1"/>
+                </a:solidFill>
+                <a:latin typeface="Calibri" panose="020F0502020204030204" pitchFamily="34" charset="0"/>
+              </a:defRPr>
+            </a:lvl5pPr>
+            <a:lvl6pPr marL="2514600" indent="-228600" eaLnBrk="0" fontAlgn="base" hangingPunct="0">
+              <a:spcBef>
+                <a:spcPct val="0"/>
+              </a:spcBef>
+              <a:spcAft>
+                <a:spcPct val="0"/>
+              </a:spcAft>
+              <a:defRPr>
+                <a:solidFill>
+                  <a:schemeClr val="tx1"/>
+                </a:solidFill>
+                <a:latin typeface="Calibri" panose="020F0502020204030204" pitchFamily="34" charset="0"/>
+              </a:defRPr>
+            </a:lvl6pPr>
+            <a:lvl7pPr marL="2971800" indent="-228600" eaLnBrk="0" fontAlgn="base" hangingPunct="0">
+              <a:spcBef>
+                <a:spcPct val="0"/>
+              </a:spcBef>
+              <a:spcAft>
+                <a:spcPct val="0"/>
+              </a:spcAft>
+              <a:defRPr>
+                <a:solidFill>
+                  <a:schemeClr val="tx1"/>
+                </a:solidFill>
+                <a:latin typeface="Calibri" panose="020F0502020204030204" pitchFamily="34" charset="0"/>
+              </a:defRPr>
+            </a:lvl7pPr>
+            <a:lvl8pPr marL="3429000" indent="-228600" eaLnBrk="0" fontAlgn="base" hangingPunct="0">
+              <a:spcBef>
+                <a:spcPct val="0"/>
+              </a:spcBef>
+              <a:spcAft>
+                <a:spcPct val="0"/>
+              </a:spcAft>
+              <a:defRPr>
+                <a:solidFill>
+                  <a:schemeClr val="tx1"/>
+                </a:solidFill>
+                <a:latin typeface="Calibri" panose="020F0502020204030204" pitchFamily="34" charset="0"/>
+              </a:defRPr>
+            </a:lvl8pPr>
+            <a:lvl9pPr marL="3886200" indent="-228600" eaLnBrk="0" fontAlgn="base" hangingPunct="0">
+              <a:spcBef>
+                <a:spcPct val="0"/>
+              </a:spcBef>
+              <a:spcAft>
+                <a:spcPct val="0"/>
+              </a:spcAft>
+              <a:defRPr>
+                <a:solidFill>
+                  <a:schemeClr val="tx1"/>
+                </a:solidFill>
+                <a:latin typeface="Calibri" panose="020F0502020204030204" pitchFamily="34" charset="0"/>
+              </a:defRPr>
+            </a:lvl9pPr>
+          </a:lstStyle>
+          <a:p>
+            <a:pPr algn="ctr" eaLnBrk="1" hangingPunct="1"/>
+            <a:r>
+              <a:rPr lang="en-US" altLang="en-US" sz="2250" dirty="0">
+                <a:latin typeface="Amazon Ember" panose="020B0603020204020204" pitchFamily="34" charset="0"/>
+                <a:ea typeface="Amazon Ember" panose="020B0603020204020204" pitchFamily="34" charset="0"/>
+                <a:cs typeface="Amazon Ember" panose="020B0603020204020204" pitchFamily="34" charset="0"/>
+              </a:rPr>
+              <a:t>AWS CloudFormation</a:t>
+            </a:r>
+          </a:p>
+        </p:txBody>
+      </p:sp>
+      <p:pic>
+        <p:nvPicPr>
+          <p:cNvPr id="69" name="Graphic 21">
+            <a:extLst>
+              <a:ext uri="{FF2B5EF4-FFF2-40B4-BE49-F238E27FC236}">
+                <a16:creationId xmlns:a16="http://schemas.microsoft.com/office/drawing/2014/main" id="{3B1CF4CF-31CB-7F46-B7A1-A49565EA6F9E}"/>
+              </a:ext>
+            </a:extLst>
+          </p:cNvPr>
+          <p:cNvPicPr>
+            <a:picLocks noChangeAspect="1" noChangeArrowheads="1"/>
+          </p:cNvPicPr>
+          <p:nvPr/>
+        </p:nvPicPr>
+        <p:blipFill>
+          <a:blip r:embed="rId6">
+            <a:extLst>
+              <a:ext uri="{28A0092B-C50C-407E-A947-70E740481C1C}">
+                <a14:useLocalDpi xmlns:a14="http://schemas.microsoft.com/office/drawing/2010/main" val="0"/>
+              </a:ext>
+            </a:extLst>
+          </a:blip>
+          <a:srcRect/>
+          <a:stretch>
+            <a:fillRect/>
+          </a:stretch>
+        </p:blipFill>
+        <p:spPr bwMode="auto">
+          <a:xfrm>
+            <a:off x="6505811" y="8441045"/>
+            <a:ext cx="1099644" cy="1099644"/>
+          </a:xfrm>
+          <a:prstGeom prst="rect">
+            <a:avLst/>
+          </a:prstGeom>
+          <a:noFill/>
+          <a:ln>
+            <a:noFill/>
+          </a:ln>
+          <a:extLst>
+            <a:ext uri="{909E8E84-426E-40DD-AFC4-6F175D3DCCD1}">
+              <a14:hiddenFill xmlns:a14="http://schemas.microsoft.com/office/drawing/2010/main">
+                <a:solidFill>
+                  <a:srgbClr val="FFFFFF"/>
+                </a:solidFill>
+              </a14:hiddenFill>
+            </a:ext>
+            <a:ext uri="{91240B29-F687-4F45-9708-019B960494DF}">
+              <a14:hiddenLine xmlns:a14="http://schemas.microsoft.com/office/drawing/2010/main" w="9525">
+                <a:solidFill>
+                  <a:srgbClr val="000000"/>
+                </a:solidFill>
+                <a:miter lim="800000"/>
+                <a:headEnd/>
+                <a:tailEnd/>
+              </a14:hiddenLine>
+            </a:ext>
+          </a:extLst>
+        </p:spPr>
+      </p:pic>
+      <p:sp>
+        <p:nvSpPr>
+          <p:cNvPr id="70" name="TextBox 12">
+            <a:extLst>
+              <a:ext uri="{FF2B5EF4-FFF2-40B4-BE49-F238E27FC236}">
+                <a16:creationId xmlns:a16="http://schemas.microsoft.com/office/drawing/2014/main" id="{2D4FF95C-9AA0-5446-9336-E58A707185DF}"/>
+              </a:ext>
+            </a:extLst>
+          </p:cNvPr>
+          <p:cNvSpPr txBox="1">
+            <a:spLocks noChangeArrowheads="1"/>
+          </p:cNvSpPr>
+          <p:nvPr/>
+        </p:nvSpPr>
+        <p:spPr bwMode="auto">
+          <a:xfrm>
+            <a:off x="9272034" y="9856973"/>
+            <a:ext cx="4274344" cy="438582"/>
+          </a:xfrm>
+          <a:prstGeom prst="rect">
+            <a:avLst/>
+          </a:prstGeom>
+          <a:noFill/>
+          <a:ln>
+            <a:noFill/>
+          </a:ln>
+          <a:extLst>
+            <a:ext uri="{909E8E84-426E-40DD-AFC4-6F175D3DCCD1}">
+              <a14:hiddenFill xmlns:a14="http://schemas.microsoft.com/office/drawing/2010/main">
+                <a:solidFill>
+                  <a:srgbClr val="FFFFFF"/>
+                </a:solidFill>
+              </a14:hiddenFill>
+            </a:ext>
+            <a:ext uri="{91240B29-F687-4F45-9708-019B960494DF}">
+              <a14:hiddenLine xmlns:a14="http://schemas.microsoft.com/office/drawing/2010/main" w="9525">
+                <a:solidFill>
+                  <a:srgbClr val="000000"/>
+                </a:solidFill>
+                <a:miter lim="800000"/>
+                <a:headEnd/>
+                <a:tailEnd/>
+              </a14:hiddenLine>
+            </a:ext>
+          </a:extLst>
+        </p:spPr>
+        <p:txBody>
+          <a:bodyPr>
+            <a:spAutoFit/>
+          </a:bodyPr>
+          <a:lstStyle>
+            <a:lvl1pPr>
+              <a:defRPr>
+                <a:solidFill>
+                  <a:schemeClr val="tx1"/>
+                </a:solidFill>
+                <a:latin typeface="Calibri" panose="020F0502020204030204" pitchFamily="34" charset="0"/>
+              </a:defRPr>
+            </a:lvl1pPr>
+            <a:lvl2pPr marL="742950" indent="-285750">
+              <a:defRPr>
+                <a:solidFill>
+                  <a:schemeClr val="tx1"/>
+                </a:solidFill>
+                <a:latin typeface="Calibri" panose="020F0502020204030204" pitchFamily="34" charset="0"/>
+              </a:defRPr>
+            </a:lvl2pPr>
+            <a:lvl3pPr marL="1143000" indent="-228600">
+              <a:defRPr>
+                <a:solidFill>
+                  <a:schemeClr val="tx1"/>
+                </a:solidFill>
+                <a:latin typeface="Calibri" panose="020F0502020204030204" pitchFamily="34" charset="0"/>
+              </a:defRPr>
+            </a:lvl3pPr>
+            <a:lvl4pPr marL="1600200" indent="-228600">
+              <a:defRPr>
+                <a:solidFill>
+                  <a:schemeClr val="tx1"/>
+                </a:solidFill>
+                <a:latin typeface="Calibri" panose="020F0502020204030204" pitchFamily="34" charset="0"/>
+              </a:defRPr>
+            </a:lvl4pPr>
+            <a:lvl5pPr marL="2057400" indent="-228600">
+              <a:defRPr>
+                <a:solidFill>
+                  <a:schemeClr val="tx1"/>
+                </a:solidFill>
+                <a:latin typeface="Calibri" panose="020F0502020204030204" pitchFamily="34" charset="0"/>
+              </a:defRPr>
+            </a:lvl5pPr>
+            <a:lvl6pPr marL="2514600" indent="-228600" eaLnBrk="0" fontAlgn="base" hangingPunct="0">
+              <a:spcBef>
+                <a:spcPct val="0"/>
+              </a:spcBef>
+              <a:spcAft>
+                <a:spcPct val="0"/>
+              </a:spcAft>
+              <a:defRPr>
+                <a:solidFill>
+                  <a:schemeClr val="tx1"/>
+                </a:solidFill>
+                <a:latin typeface="Calibri" panose="020F0502020204030204" pitchFamily="34" charset="0"/>
+              </a:defRPr>
+            </a:lvl6pPr>
+            <a:lvl7pPr marL="2971800" indent="-228600" eaLnBrk="0" fontAlgn="base" hangingPunct="0">
+              <a:spcBef>
+                <a:spcPct val="0"/>
+              </a:spcBef>
+              <a:spcAft>
+                <a:spcPct val="0"/>
+              </a:spcAft>
+              <a:defRPr>
+                <a:solidFill>
+                  <a:schemeClr val="tx1"/>
+                </a:solidFill>
+                <a:latin typeface="Calibri" panose="020F0502020204030204" pitchFamily="34" charset="0"/>
+              </a:defRPr>
+            </a:lvl7pPr>
+            <a:lvl8pPr marL="3429000" indent="-228600" eaLnBrk="0" fontAlgn="base" hangingPunct="0">
+              <a:spcBef>
+                <a:spcPct val="0"/>
+              </a:spcBef>
+              <a:spcAft>
+                <a:spcPct val="0"/>
+              </a:spcAft>
+              <a:defRPr>
+                <a:solidFill>
+                  <a:schemeClr val="tx1"/>
+                </a:solidFill>
+                <a:latin typeface="Calibri" panose="020F0502020204030204" pitchFamily="34" charset="0"/>
+              </a:defRPr>
+            </a:lvl8pPr>
+            <a:lvl9pPr marL="3886200" indent="-228600" eaLnBrk="0" fontAlgn="base" hangingPunct="0">
+              <a:spcBef>
+                <a:spcPct val="0"/>
+              </a:spcBef>
+              <a:spcAft>
+                <a:spcPct val="0"/>
+              </a:spcAft>
+              <a:defRPr>
+                <a:solidFill>
+                  <a:schemeClr val="tx1"/>
+                </a:solidFill>
+                <a:latin typeface="Calibri" panose="020F0502020204030204" pitchFamily="34" charset="0"/>
+              </a:defRPr>
+            </a:lvl9pPr>
+          </a:lstStyle>
+          <a:p>
+            <a:pPr algn="ctr" eaLnBrk="1" hangingPunct="1"/>
+            <a:r>
+              <a:rPr lang="en-US" altLang="en-US" sz="2250" dirty="0">
+                <a:latin typeface="Amazon Ember" panose="020B0603020204020204" pitchFamily="34" charset="0"/>
+                <a:ea typeface="Amazon Ember" panose="020B0603020204020204" pitchFamily="34" charset="0"/>
+                <a:cs typeface="Amazon Ember" panose="020B0603020204020204" pitchFamily="34" charset="0"/>
+              </a:rPr>
+              <a:t>AWS CloudFormation</a:t>
+            </a:r>
+          </a:p>
+        </p:txBody>
+      </p:sp>
+      <p:sp>
+        <p:nvSpPr>
+          <p:cNvPr id="71" name="TextBox 12">
+            <a:extLst>
+              <a:ext uri="{FF2B5EF4-FFF2-40B4-BE49-F238E27FC236}">
+                <a16:creationId xmlns:a16="http://schemas.microsoft.com/office/drawing/2014/main" id="{AA932E9A-3E0C-FF46-B9FF-E57CDD48020F}"/>
+              </a:ext>
+            </a:extLst>
+          </p:cNvPr>
+          <p:cNvSpPr txBox="1">
+            <a:spLocks noChangeArrowheads="1"/>
+          </p:cNvSpPr>
+          <p:nvPr/>
+        </p:nvSpPr>
+        <p:spPr bwMode="auto">
+          <a:xfrm>
+            <a:off x="13673556" y="9855872"/>
+            <a:ext cx="4274344" cy="438582"/>
+          </a:xfrm>
+          <a:prstGeom prst="rect">
+            <a:avLst/>
+          </a:prstGeom>
+          <a:noFill/>
+          <a:ln>
+            <a:noFill/>
+          </a:ln>
+          <a:extLst>
+            <a:ext uri="{909E8E84-426E-40DD-AFC4-6F175D3DCCD1}">
+              <a14:hiddenFill xmlns:a14="http://schemas.microsoft.com/office/drawing/2010/main">
+                <a:solidFill>
+                  <a:srgbClr val="FFFFFF"/>
+                </a:solidFill>
+              </a14:hiddenFill>
+            </a:ext>
+            <a:ext uri="{91240B29-F687-4F45-9708-019B960494DF}">
+              <a14:hiddenLine xmlns:a14="http://schemas.microsoft.com/office/drawing/2010/main" w="9525">
+                <a:solidFill>
+                  <a:srgbClr val="000000"/>
+                </a:solidFill>
+                <a:miter lim="800000"/>
+                <a:headEnd/>
+                <a:tailEnd/>
+              </a14:hiddenLine>
+            </a:ext>
+          </a:extLst>
+        </p:spPr>
+        <p:txBody>
+          <a:bodyPr>
+            <a:spAutoFit/>
+          </a:bodyPr>
+          <a:lstStyle>
+            <a:lvl1pPr>
+              <a:defRPr>
+                <a:solidFill>
+                  <a:schemeClr val="tx1"/>
+                </a:solidFill>
+                <a:latin typeface="Calibri" panose="020F0502020204030204" pitchFamily="34" charset="0"/>
+              </a:defRPr>
+            </a:lvl1pPr>
+            <a:lvl2pPr marL="742950" indent="-285750">
+              <a:defRPr>
+                <a:solidFill>
+                  <a:schemeClr val="tx1"/>
+                </a:solidFill>
+                <a:latin typeface="Calibri" panose="020F0502020204030204" pitchFamily="34" charset="0"/>
+              </a:defRPr>
+            </a:lvl2pPr>
+            <a:lvl3pPr marL="1143000" indent="-228600">
+              <a:defRPr>
+                <a:solidFill>
+                  <a:schemeClr val="tx1"/>
+                </a:solidFill>
+                <a:latin typeface="Calibri" panose="020F0502020204030204" pitchFamily="34" charset="0"/>
+              </a:defRPr>
+            </a:lvl3pPr>
+            <a:lvl4pPr marL="1600200" indent="-228600">
+              <a:defRPr>
+                <a:solidFill>
+                  <a:schemeClr val="tx1"/>
+                </a:solidFill>
+                <a:latin typeface="Calibri" panose="020F0502020204030204" pitchFamily="34" charset="0"/>
+              </a:defRPr>
+            </a:lvl4pPr>
+            <a:lvl5pPr marL="2057400" indent="-228600">
+              <a:defRPr>
+                <a:solidFill>
+                  <a:schemeClr val="tx1"/>
+                </a:solidFill>
+                <a:latin typeface="Calibri" panose="020F0502020204030204" pitchFamily="34" charset="0"/>
+              </a:defRPr>
+            </a:lvl5pPr>
+            <a:lvl6pPr marL="2514600" indent="-228600" eaLnBrk="0" fontAlgn="base" hangingPunct="0">
+              <a:spcBef>
+                <a:spcPct val="0"/>
+              </a:spcBef>
+              <a:spcAft>
+                <a:spcPct val="0"/>
+              </a:spcAft>
+              <a:defRPr>
+                <a:solidFill>
+                  <a:schemeClr val="tx1"/>
+                </a:solidFill>
+                <a:latin typeface="Calibri" panose="020F0502020204030204" pitchFamily="34" charset="0"/>
+              </a:defRPr>
+            </a:lvl6pPr>
+            <a:lvl7pPr marL="2971800" indent="-228600" eaLnBrk="0" fontAlgn="base" hangingPunct="0">
+              <a:spcBef>
+                <a:spcPct val="0"/>
+              </a:spcBef>
+              <a:spcAft>
+                <a:spcPct val="0"/>
+              </a:spcAft>
+              <a:defRPr>
+                <a:solidFill>
+                  <a:schemeClr val="tx1"/>
+                </a:solidFill>
+                <a:latin typeface="Calibri" panose="020F0502020204030204" pitchFamily="34" charset="0"/>
+              </a:defRPr>
+            </a:lvl7pPr>
+            <a:lvl8pPr marL="3429000" indent="-228600" eaLnBrk="0" fontAlgn="base" hangingPunct="0">
+              <a:spcBef>
+                <a:spcPct val="0"/>
+              </a:spcBef>
+              <a:spcAft>
+                <a:spcPct val="0"/>
+              </a:spcAft>
+              <a:defRPr>
+                <a:solidFill>
+                  <a:schemeClr val="tx1"/>
+                </a:solidFill>
+                <a:latin typeface="Calibri" panose="020F0502020204030204" pitchFamily="34" charset="0"/>
+              </a:defRPr>
+            </a:lvl8pPr>
+            <a:lvl9pPr marL="3886200" indent="-228600" eaLnBrk="0" fontAlgn="base" hangingPunct="0">
+              <a:spcBef>
+                <a:spcPct val="0"/>
+              </a:spcBef>
+              <a:spcAft>
+                <a:spcPct val="0"/>
+              </a:spcAft>
+              <a:defRPr>
+                <a:solidFill>
+                  <a:schemeClr val="tx1"/>
+                </a:solidFill>
+                <a:latin typeface="Calibri" panose="020F0502020204030204" pitchFamily="34" charset="0"/>
+              </a:defRPr>
+            </a:lvl9pPr>
+          </a:lstStyle>
+          <a:p>
+            <a:pPr algn="ctr" eaLnBrk="1" hangingPunct="1"/>
+            <a:r>
+              <a:rPr lang="en-US" altLang="en-US" sz="2250" dirty="0">
+                <a:latin typeface="Amazon Ember" panose="020B0603020204020204" pitchFamily="34" charset="0"/>
+                <a:ea typeface="Amazon Ember" panose="020B0603020204020204" pitchFamily="34" charset="0"/>
+                <a:cs typeface="Amazon Ember" panose="020B0603020204020204" pitchFamily="34" charset="0"/>
+              </a:rPr>
+              <a:t>AWS CodeCommit</a:t>
+            </a:r>
+          </a:p>
+        </p:txBody>
+      </p:sp>
+      <p:sp>
+        <p:nvSpPr>
+          <p:cNvPr id="72" name="TextBox 12">
+            <a:extLst>
+              <a:ext uri="{FF2B5EF4-FFF2-40B4-BE49-F238E27FC236}">
+                <a16:creationId xmlns:a16="http://schemas.microsoft.com/office/drawing/2014/main" id="{17263CB3-BDFF-F041-9550-8F4A0A14D631}"/>
+              </a:ext>
+            </a:extLst>
+          </p:cNvPr>
+          <p:cNvSpPr txBox="1">
+            <a:spLocks noChangeArrowheads="1"/>
+          </p:cNvSpPr>
+          <p:nvPr/>
+        </p:nvSpPr>
+        <p:spPr bwMode="auto">
+          <a:xfrm>
+            <a:off x="516941" y="9855870"/>
+            <a:ext cx="4274344" cy="438582"/>
+          </a:xfrm>
+          <a:prstGeom prst="rect">
+            <a:avLst/>
+          </a:prstGeom>
+          <a:noFill/>
+          <a:ln>
+            <a:noFill/>
+          </a:ln>
+          <a:extLst>
+            <a:ext uri="{909E8E84-426E-40DD-AFC4-6F175D3DCCD1}">
+              <a14:hiddenFill xmlns:a14="http://schemas.microsoft.com/office/drawing/2010/main">
+                <a:solidFill>
+                  <a:srgbClr val="FFFFFF"/>
+                </a:solidFill>
+              </a14:hiddenFill>
+            </a:ext>
+            <a:ext uri="{91240B29-F687-4F45-9708-019B960494DF}">
+              <a14:hiddenLine xmlns:a14="http://schemas.microsoft.com/office/drawing/2010/main" w="9525">
+                <a:solidFill>
+                  <a:srgbClr val="000000"/>
+                </a:solidFill>
+                <a:miter lim="800000"/>
+                <a:headEnd/>
+                <a:tailEnd/>
+              </a14:hiddenLine>
+            </a:ext>
+          </a:extLst>
+        </p:spPr>
+        <p:txBody>
+          <a:bodyPr>
+            <a:spAutoFit/>
+          </a:bodyPr>
+          <a:lstStyle>
+            <a:lvl1pPr>
+              <a:defRPr>
+                <a:solidFill>
+                  <a:schemeClr val="tx1"/>
+                </a:solidFill>
+                <a:latin typeface="Calibri" panose="020F0502020204030204" pitchFamily="34" charset="0"/>
+              </a:defRPr>
+            </a:lvl1pPr>
+            <a:lvl2pPr marL="742950" indent="-285750">
+              <a:defRPr>
+                <a:solidFill>
+                  <a:schemeClr val="tx1"/>
+                </a:solidFill>
+                <a:latin typeface="Calibri" panose="020F0502020204030204" pitchFamily="34" charset="0"/>
+              </a:defRPr>
+            </a:lvl2pPr>
+            <a:lvl3pPr marL="1143000" indent="-228600">
+              <a:defRPr>
+                <a:solidFill>
+                  <a:schemeClr val="tx1"/>
+                </a:solidFill>
+                <a:latin typeface="Calibri" panose="020F0502020204030204" pitchFamily="34" charset="0"/>
+              </a:defRPr>
+            </a:lvl3pPr>
+            <a:lvl4pPr marL="1600200" indent="-228600">
+              <a:defRPr>
+                <a:solidFill>
+                  <a:schemeClr val="tx1"/>
+                </a:solidFill>
+                <a:latin typeface="Calibri" panose="020F0502020204030204" pitchFamily="34" charset="0"/>
+              </a:defRPr>
+            </a:lvl4pPr>
+            <a:lvl5pPr marL="2057400" indent="-228600">
+              <a:defRPr>
+                <a:solidFill>
+                  <a:schemeClr val="tx1"/>
+                </a:solidFill>
+                <a:latin typeface="Calibri" panose="020F0502020204030204" pitchFamily="34" charset="0"/>
+              </a:defRPr>
+            </a:lvl5pPr>
+            <a:lvl6pPr marL="2514600" indent="-228600" eaLnBrk="0" fontAlgn="base" hangingPunct="0">
+              <a:spcBef>
+                <a:spcPct val="0"/>
+              </a:spcBef>
+              <a:spcAft>
+                <a:spcPct val="0"/>
+              </a:spcAft>
+              <a:defRPr>
+                <a:solidFill>
+                  <a:schemeClr val="tx1"/>
+                </a:solidFill>
+                <a:latin typeface="Calibri" panose="020F0502020204030204" pitchFamily="34" charset="0"/>
+              </a:defRPr>
+            </a:lvl6pPr>
+            <a:lvl7pPr marL="2971800" indent="-228600" eaLnBrk="0" fontAlgn="base" hangingPunct="0">
+              <a:spcBef>
+                <a:spcPct val="0"/>
+              </a:spcBef>
+              <a:spcAft>
+                <a:spcPct val="0"/>
+              </a:spcAft>
+              <a:defRPr>
+                <a:solidFill>
+                  <a:schemeClr val="tx1"/>
+                </a:solidFill>
+                <a:latin typeface="Calibri" panose="020F0502020204030204" pitchFamily="34" charset="0"/>
+              </a:defRPr>
+            </a:lvl7pPr>
+            <a:lvl8pPr marL="3429000" indent="-228600" eaLnBrk="0" fontAlgn="base" hangingPunct="0">
+              <a:spcBef>
+                <a:spcPct val="0"/>
+              </a:spcBef>
+              <a:spcAft>
+                <a:spcPct val="0"/>
+              </a:spcAft>
+              <a:defRPr>
+                <a:solidFill>
+                  <a:schemeClr val="tx1"/>
+                </a:solidFill>
+                <a:latin typeface="Calibri" panose="020F0502020204030204" pitchFamily="34" charset="0"/>
+              </a:defRPr>
+            </a:lvl8pPr>
+            <a:lvl9pPr marL="3886200" indent="-228600" eaLnBrk="0" fontAlgn="base" hangingPunct="0">
+              <a:spcBef>
+                <a:spcPct val="0"/>
+              </a:spcBef>
+              <a:spcAft>
+                <a:spcPct val="0"/>
+              </a:spcAft>
+              <a:defRPr>
+                <a:solidFill>
+                  <a:schemeClr val="tx1"/>
+                </a:solidFill>
+                <a:latin typeface="Calibri" panose="020F0502020204030204" pitchFamily="34" charset="0"/>
+              </a:defRPr>
+            </a:lvl9pPr>
+          </a:lstStyle>
+          <a:p>
+            <a:pPr algn="ctr" eaLnBrk="1" hangingPunct="1"/>
+            <a:r>
+              <a:rPr lang="en-US" altLang="en-US" sz="2250" dirty="0">
+                <a:latin typeface="Amazon Ember" panose="020B0603020204020204" pitchFamily="34" charset="0"/>
+                <a:ea typeface="Amazon Ember" panose="020B0603020204020204" pitchFamily="34" charset="0"/>
+                <a:cs typeface="Amazon Ember" panose="020B0603020204020204" pitchFamily="34" charset="0"/>
+              </a:rPr>
+              <a:t>AWS S3</a:t>
+            </a:r>
+          </a:p>
+        </p:txBody>
+      </p:sp>
+      <p:sp>
+        <p:nvSpPr>
+          <p:cNvPr id="73" name="TextBox 72">
+            <a:extLst>
+              <a:ext uri="{FF2B5EF4-FFF2-40B4-BE49-F238E27FC236}">
+                <a16:creationId xmlns:a16="http://schemas.microsoft.com/office/drawing/2014/main" id="{14316100-85BB-044B-A5F8-FCBA13953A87}"/>
+              </a:ext>
+            </a:extLst>
+          </p:cNvPr>
+          <p:cNvSpPr txBox="1"/>
+          <p:nvPr/>
+        </p:nvSpPr>
+        <p:spPr>
+          <a:xfrm>
+            <a:off x="525463" y="1301768"/>
+            <a:ext cx="12306574" cy="957955"/>
+          </a:xfrm>
+          <a:prstGeom prst="rect">
+            <a:avLst/>
+          </a:prstGeom>
+          <a:noFill/>
+        </p:spPr>
+        <p:txBody>
+          <a:bodyPr wrap="none" rtlCol="0">
+            <a:spAutoFit/>
+          </a:bodyPr>
+          <a:lstStyle/>
+          <a:p>
+            <a:r>
+              <a:rPr lang="en-US" sz="5625" dirty="0">
+                <a:latin typeface="Amazon Ember" panose="020B0603020204020204" pitchFamily="34" charset="0"/>
+                <a:ea typeface="Amazon Ember" panose="020B0603020204020204" pitchFamily="34" charset="0"/>
+                <a:cs typeface="Amazon Ember" panose="020B0603020204020204" pitchFamily="34" charset="0"/>
+              </a:rPr>
+              <a:t>AMC QuickStart Delete All Command</a:t>
+            </a:r>
+          </a:p>
+        </p:txBody>
+      </p:sp>
+    </p:spTree>
+    <p:extLst>
+      <p:ext uri="{BB962C8B-B14F-4D97-AF65-F5344CB8AC3E}">
+        <p14:creationId xmlns:p14="http://schemas.microsoft.com/office/powerpoint/2010/main" val="3295528322"/>
       </p:ext>
     </p:extLst>
   </p:cSld>

</xml_diff>